<commit_message>
actualizacion de la sesion 4 de la capacitacion de PHP
</commit_message>
<xml_diff>
--- a/documentacion/Presentación1.pptx
+++ b/documentacion/Presentación1.pptx
@@ -8,6 +8,7 @@
     <p:sldId id="256" r:id="rId2"/>
     <p:sldId id="257" r:id="rId3"/>
     <p:sldId id="258" r:id="rId4"/>
+    <p:sldId id="259" r:id="rId5"/>
   </p:sldIdLst>
   <p:sldSz cx="12192000" cy="6858000"/>
   <p:notesSz cx="6858000" cy="9144000"/>
@@ -263,7 +264,7 @@
           <a:p>
             <a:fld id="{626178A4-4DCD-46FF-9DA1-8D3976C44B69}" type="datetimeFigureOut">
               <a:rPr lang="es-MX" smtClean="0"/>
-              <a:t>18/01/2022</a:t>
+              <a:t>20/01/2022</a:t>
             </a:fld>
             <a:endParaRPr lang="es-MX"/>
           </a:p>
@@ -463,7 +464,7 @@
           <a:p>
             <a:fld id="{626178A4-4DCD-46FF-9DA1-8D3976C44B69}" type="datetimeFigureOut">
               <a:rPr lang="es-MX" smtClean="0"/>
-              <a:t>18/01/2022</a:t>
+              <a:t>20/01/2022</a:t>
             </a:fld>
             <a:endParaRPr lang="es-MX"/>
           </a:p>
@@ -673,7 +674,7 @@
           <a:p>
             <a:fld id="{626178A4-4DCD-46FF-9DA1-8D3976C44B69}" type="datetimeFigureOut">
               <a:rPr lang="es-MX" smtClean="0"/>
-              <a:t>18/01/2022</a:t>
+              <a:t>20/01/2022</a:t>
             </a:fld>
             <a:endParaRPr lang="es-MX"/>
           </a:p>
@@ -873,7 +874,7 @@
           <a:p>
             <a:fld id="{626178A4-4DCD-46FF-9DA1-8D3976C44B69}" type="datetimeFigureOut">
               <a:rPr lang="es-MX" smtClean="0"/>
-              <a:t>18/01/2022</a:t>
+              <a:t>20/01/2022</a:t>
             </a:fld>
             <a:endParaRPr lang="es-MX"/>
           </a:p>
@@ -1149,7 +1150,7 @@
           <a:p>
             <a:fld id="{626178A4-4DCD-46FF-9DA1-8D3976C44B69}" type="datetimeFigureOut">
               <a:rPr lang="es-MX" smtClean="0"/>
-              <a:t>18/01/2022</a:t>
+              <a:t>20/01/2022</a:t>
             </a:fld>
             <a:endParaRPr lang="es-MX"/>
           </a:p>
@@ -1417,7 +1418,7 @@
           <a:p>
             <a:fld id="{626178A4-4DCD-46FF-9DA1-8D3976C44B69}" type="datetimeFigureOut">
               <a:rPr lang="es-MX" smtClean="0"/>
-              <a:t>18/01/2022</a:t>
+              <a:t>20/01/2022</a:t>
             </a:fld>
             <a:endParaRPr lang="es-MX"/>
           </a:p>
@@ -1832,7 +1833,7 @@
           <a:p>
             <a:fld id="{626178A4-4DCD-46FF-9DA1-8D3976C44B69}" type="datetimeFigureOut">
               <a:rPr lang="es-MX" smtClean="0"/>
-              <a:t>18/01/2022</a:t>
+              <a:t>20/01/2022</a:t>
             </a:fld>
             <a:endParaRPr lang="es-MX"/>
           </a:p>
@@ -1974,7 +1975,7 @@
           <a:p>
             <a:fld id="{626178A4-4DCD-46FF-9DA1-8D3976C44B69}" type="datetimeFigureOut">
               <a:rPr lang="es-MX" smtClean="0"/>
-              <a:t>18/01/2022</a:t>
+              <a:t>20/01/2022</a:t>
             </a:fld>
             <a:endParaRPr lang="es-MX"/>
           </a:p>
@@ -2087,7 +2088,7 @@
           <a:p>
             <a:fld id="{626178A4-4DCD-46FF-9DA1-8D3976C44B69}" type="datetimeFigureOut">
               <a:rPr lang="es-MX" smtClean="0"/>
-              <a:t>18/01/2022</a:t>
+              <a:t>20/01/2022</a:t>
             </a:fld>
             <a:endParaRPr lang="es-MX"/>
           </a:p>
@@ -2400,7 +2401,7 @@
           <a:p>
             <a:fld id="{626178A4-4DCD-46FF-9DA1-8D3976C44B69}" type="datetimeFigureOut">
               <a:rPr lang="es-MX" smtClean="0"/>
-              <a:t>18/01/2022</a:t>
+              <a:t>20/01/2022</a:t>
             </a:fld>
             <a:endParaRPr lang="es-MX"/>
           </a:p>
@@ -2689,7 +2690,7 @@
           <a:p>
             <a:fld id="{626178A4-4DCD-46FF-9DA1-8D3976C44B69}" type="datetimeFigureOut">
               <a:rPr lang="es-MX" smtClean="0"/>
-              <a:t>18/01/2022</a:t>
+              <a:t>20/01/2022</a:t>
             </a:fld>
             <a:endParaRPr lang="es-MX"/>
           </a:p>
@@ -2932,7 +2933,7 @@
           <a:p>
             <a:fld id="{626178A4-4DCD-46FF-9DA1-8D3976C44B69}" type="datetimeFigureOut">
               <a:rPr lang="es-MX" smtClean="0"/>
-              <a:t>18/01/2022</a:t>
+              <a:t>20/01/2022</a:t>
             </a:fld>
             <a:endParaRPr lang="es-MX"/>
           </a:p>
@@ -4026,6 +4027,547 @@
 </p:sld>
 </file>
 
+<file path=ppt/slides/slide4.xml><?xml version="1.0" encoding="utf-8"?>
+<p:sld xmlns:a="http://schemas.openxmlformats.org/drawingml/2006/main" xmlns:r="http://schemas.openxmlformats.org/officeDocument/2006/relationships" xmlns:p="http://schemas.openxmlformats.org/presentationml/2006/main">
+  <p:cSld>
+    <p:spTree>
+      <p:nvGrpSpPr>
+        <p:cNvPr id="1" name=""/>
+        <p:cNvGrpSpPr/>
+        <p:nvPr/>
+      </p:nvGrpSpPr>
+      <p:grpSpPr>
+        <a:xfrm>
+          <a:off x="0" y="0"/>
+          <a:ext cx="0" cy="0"/>
+          <a:chOff x="0" y="0"/>
+          <a:chExt cx="0" cy="0"/>
+        </a:xfrm>
+      </p:grpSpPr>
+      <p:sp>
+        <p:nvSpPr>
+          <p:cNvPr id="4" name="Rectángulo: esquinas redondeadas 3">
+            <a:extLst>
+              <a:ext uri="{FF2B5EF4-FFF2-40B4-BE49-F238E27FC236}">
+                <a16:creationId xmlns:a16="http://schemas.microsoft.com/office/drawing/2014/main" id="{0EA947C0-7E84-44F1-8217-4C7A7C501681}"/>
+              </a:ext>
+            </a:extLst>
+          </p:cNvPr>
+          <p:cNvSpPr/>
+          <p:nvPr/>
+        </p:nvSpPr>
+        <p:spPr>
+          <a:xfrm>
+            <a:off x="646981" y="405442"/>
+            <a:ext cx="10783019" cy="802256"/>
+          </a:xfrm>
+          <a:prstGeom prst="roundRect">
+            <a:avLst/>
+          </a:prstGeom>
+        </p:spPr>
+        <p:style>
+          <a:lnRef idx="2">
+            <a:schemeClr val="accent1">
+              <a:shade val="50000"/>
+            </a:schemeClr>
+          </a:lnRef>
+          <a:fillRef idx="1">
+            <a:schemeClr val="accent1"/>
+          </a:fillRef>
+          <a:effectRef idx="0">
+            <a:schemeClr val="accent1"/>
+          </a:effectRef>
+          <a:fontRef idx="minor">
+            <a:schemeClr val="lt1"/>
+          </a:fontRef>
+        </p:style>
+        <p:txBody>
+          <a:bodyPr rtlCol="0" anchor="ctr"/>
+          <a:lstStyle/>
+          <a:p>
+            <a:pPr algn="ctr"/>
+            <a:r>
+              <a:rPr lang="es-MX" dirty="0"/>
+              <a:t>ESTO ES EL MENU</a:t>
+            </a:r>
+          </a:p>
+        </p:txBody>
+      </p:sp>
+      <p:graphicFrame>
+        <p:nvGraphicFramePr>
+          <p:cNvPr id="5" name="Tabla 5">
+            <a:extLst>
+              <a:ext uri="{FF2B5EF4-FFF2-40B4-BE49-F238E27FC236}">
+                <a16:creationId xmlns:a16="http://schemas.microsoft.com/office/drawing/2014/main" id="{3247D1F9-EC2A-46E1-B117-142855662E3B}"/>
+              </a:ext>
+            </a:extLst>
+          </p:cNvPr>
+          <p:cNvGraphicFramePr>
+            <a:graphicFrameLocks noGrp="1"/>
+          </p:cNvGraphicFramePr>
+          <p:nvPr>
+            <p:extLst>
+              <p:ext uri="{D42A27DB-BD31-4B8C-83A1-F6EECF244321}">
+                <p14:modId xmlns:p14="http://schemas.microsoft.com/office/powerpoint/2010/main" val="1283017979"/>
+              </p:ext>
+            </p:extLst>
+          </p:nvPr>
+        </p:nvGraphicFramePr>
+        <p:xfrm>
+          <a:off x="1126227" y="3915083"/>
+          <a:ext cx="9829320" cy="1385177"/>
+        </p:xfrm>
+        <a:graphic>
+          <a:graphicData uri="http://schemas.openxmlformats.org/drawingml/2006/table">
+            <a:tbl>
+              <a:tblPr firstRow="1" bandRow="1">
+                <a:tableStyleId>{5C22544A-7EE6-4342-B048-85BDC9FD1C3A}</a:tableStyleId>
+              </a:tblPr>
+              <a:tblGrid>
+                <a:gridCol w="1965864">
+                  <a:extLst>
+                    <a:ext uri="{9D8B030D-6E8A-4147-A177-3AD203B41FA5}">
+                      <a16:colId xmlns:a16="http://schemas.microsoft.com/office/drawing/2014/main" val="1749993445"/>
+                    </a:ext>
+                  </a:extLst>
+                </a:gridCol>
+                <a:gridCol w="1965864">
+                  <a:extLst>
+                    <a:ext uri="{9D8B030D-6E8A-4147-A177-3AD203B41FA5}">
+                      <a16:colId xmlns:a16="http://schemas.microsoft.com/office/drawing/2014/main" val="1898327658"/>
+                    </a:ext>
+                  </a:extLst>
+                </a:gridCol>
+                <a:gridCol w="1965864">
+                  <a:extLst>
+                    <a:ext uri="{9D8B030D-6E8A-4147-A177-3AD203B41FA5}">
+                      <a16:colId xmlns:a16="http://schemas.microsoft.com/office/drawing/2014/main" val="1850561919"/>
+                    </a:ext>
+                  </a:extLst>
+                </a:gridCol>
+                <a:gridCol w="1965864">
+                  <a:extLst>
+                    <a:ext uri="{9D8B030D-6E8A-4147-A177-3AD203B41FA5}">
+                      <a16:colId xmlns:a16="http://schemas.microsoft.com/office/drawing/2014/main" val="2338338737"/>
+                    </a:ext>
+                  </a:extLst>
+                </a:gridCol>
+                <a:gridCol w="1965864">
+                  <a:extLst>
+                    <a:ext uri="{9D8B030D-6E8A-4147-A177-3AD203B41FA5}">
+                      <a16:colId xmlns:a16="http://schemas.microsoft.com/office/drawing/2014/main" val="1322404911"/>
+                    </a:ext>
+                  </a:extLst>
+                </a:gridCol>
+              </a:tblGrid>
+              <a:tr h="641663">
+                <a:tc>
+                  <a:txBody>
+                    <a:bodyPr/>
+                    <a:lstStyle/>
+                    <a:p>
+                      <a:r>
+                        <a:rPr lang="es-MX" dirty="0"/>
+                        <a:t>CLAVE</a:t>
+                      </a:r>
+                    </a:p>
+                  </a:txBody>
+                  <a:tcPr/>
+                </a:tc>
+                <a:tc>
+                  <a:txBody>
+                    <a:bodyPr/>
+                    <a:lstStyle/>
+                    <a:p>
+                      <a:r>
+                        <a:rPr lang="es-MX" dirty="0"/>
+                        <a:t>NOMBRE</a:t>
+                      </a:r>
+                    </a:p>
+                  </a:txBody>
+                  <a:tcPr/>
+                </a:tc>
+                <a:tc>
+                  <a:txBody>
+                    <a:bodyPr/>
+                    <a:lstStyle/>
+                    <a:p>
+                      <a:r>
+                        <a:rPr lang="es-MX" dirty="0"/>
+                        <a:t>APELLIDOS</a:t>
+                      </a:r>
+                    </a:p>
+                  </a:txBody>
+                  <a:tcPr/>
+                </a:tc>
+                <a:tc>
+                  <a:txBody>
+                    <a:bodyPr/>
+                    <a:lstStyle/>
+                    <a:p>
+                      <a:r>
+                        <a:rPr lang="es-MX" dirty="0"/>
+                        <a:t>DATOS DE CONTACTO</a:t>
+                      </a:r>
+                    </a:p>
+                  </a:txBody>
+                  <a:tcPr/>
+                </a:tc>
+                <a:tc>
+                  <a:txBody>
+                    <a:bodyPr/>
+                    <a:lstStyle/>
+                    <a:p>
+                      <a:r>
+                        <a:rPr lang="es-MX" dirty="0"/>
+                        <a:t>OPERACIONES</a:t>
+                      </a:r>
+                    </a:p>
+                  </a:txBody>
+                  <a:tcPr/>
+                </a:tc>
+                <a:extLst>
+                  <a:ext uri="{0D108BD9-81ED-4DB2-BD59-A6C34878D82A}">
+                    <a16:rowId xmlns:a16="http://schemas.microsoft.com/office/drawing/2014/main" val="2597275433"/>
+                  </a:ext>
+                </a:extLst>
+              </a:tr>
+              <a:tr h="371757">
+                <a:tc>
+                  <a:txBody>
+                    <a:bodyPr/>
+                    <a:lstStyle/>
+                    <a:p>
+                      <a:r>
+                        <a:rPr lang="es-MX" dirty="0"/>
+                        <a:t>ABC001</a:t>
+                      </a:r>
+                    </a:p>
+                  </a:txBody>
+                  <a:tcPr/>
+                </a:tc>
+                <a:tc>
+                  <a:txBody>
+                    <a:bodyPr/>
+                    <a:lstStyle/>
+                    <a:p>
+                      <a:r>
+                        <a:rPr lang="es-MX" dirty="0"/>
+                        <a:t>FULANITO</a:t>
+                      </a:r>
+                    </a:p>
+                  </a:txBody>
+                  <a:tcPr/>
+                </a:tc>
+                <a:tc>
+                  <a:txBody>
+                    <a:bodyPr/>
+                    <a:lstStyle/>
+                    <a:p>
+                      <a:r>
+                        <a:rPr lang="es-MX" dirty="0"/>
+                        <a:t>SANCHEZ</a:t>
+                      </a:r>
+                    </a:p>
+                  </a:txBody>
+                  <a:tcPr/>
+                </a:tc>
+                <a:tc>
+                  <a:txBody>
+                    <a:bodyPr/>
+                    <a:lstStyle/>
+                    <a:p>
+                      <a:r>
+                        <a:rPr lang="es-MX" dirty="0"/>
+                        <a:t>32165478</a:t>
+                      </a:r>
+                    </a:p>
+                  </a:txBody>
+                  <a:tcPr/>
+                </a:tc>
+                <a:tc>
+                  <a:txBody>
+                    <a:bodyPr/>
+                    <a:lstStyle/>
+                    <a:p>
+                      <a:endParaRPr lang="es-MX" dirty="0"/>
+                    </a:p>
+                  </a:txBody>
+                  <a:tcPr/>
+                </a:tc>
+                <a:extLst>
+                  <a:ext uri="{0D108BD9-81ED-4DB2-BD59-A6C34878D82A}">
+                    <a16:rowId xmlns:a16="http://schemas.microsoft.com/office/drawing/2014/main" val="1324048703"/>
+                  </a:ext>
+                </a:extLst>
+              </a:tr>
+              <a:tr h="371757">
+                <a:tc>
+                  <a:txBody>
+                    <a:bodyPr/>
+                    <a:lstStyle/>
+                    <a:p>
+                      <a:endParaRPr lang="es-MX"/>
+                    </a:p>
+                  </a:txBody>
+                  <a:tcPr/>
+                </a:tc>
+                <a:tc>
+                  <a:txBody>
+                    <a:bodyPr/>
+                    <a:lstStyle/>
+                    <a:p>
+                      <a:endParaRPr lang="es-MX"/>
+                    </a:p>
+                  </a:txBody>
+                  <a:tcPr/>
+                </a:tc>
+                <a:tc>
+                  <a:txBody>
+                    <a:bodyPr/>
+                    <a:lstStyle/>
+                    <a:p>
+                      <a:endParaRPr lang="es-MX"/>
+                    </a:p>
+                  </a:txBody>
+                  <a:tcPr/>
+                </a:tc>
+                <a:tc>
+                  <a:txBody>
+                    <a:bodyPr/>
+                    <a:lstStyle/>
+                    <a:p>
+                      <a:endParaRPr lang="es-MX" dirty="0"/>
+                    </a:p>
+                  </a:txBody>
+                  <a:tcPr/>
+                </a:tc>
+                <a:tc>
+                  <a:txBody>
+                    <a:bodyPr/>
+                    <a:lstStyle/>
+                    <a:p>
+                      <a:endParaRPr lang="es-MX" dirty="0"/>
+                    </a:p>
+                  </a:txBody>
+                  <a:tcPr/>
+                </a:tc>
+                <a:extLst>
+                  <a:ext uri="{0D108BD9-81ED-4DB2-BD59-A6C34878D82A}">
+                    <a16:rowId xmlns:a16="http://schemas.microsoft.com/office/drawing/2014/main" val="1017608078"/>
+                  </a:ext>
+                </a:extLst>
+              </a:tr>
+            </a:tbl>
+          </a:graphicData>
+        </a:graphic>
+      </p:graphicFrame>
+      <p:sp>
+        <p:nvSpPr>
+          <p:cNvPr id="7" name="Rectángulo: esquinas redondeadas 6">
+            <a:extLst>
+              <a:ext uri="{FF2B5EF4-FFF2-40B4-BE49-F238E27FC236}">
+                <a16:creationId xmlns:a16="http://schemas.microsoft.com/office/drawing/2014/main" id="{DAB46E5C-A2F2-48A4-82FA-23D282441014}"/>
+              </a:ext>
+            </a:extLst>
+          </p:cNvPr>
+          <p:cNvSpPr/>
+          <p:nvPr/>
+        </p:nvSpPr>
+        <p:spPr>
+          <a:xfrm>
+            <a:off x="9444486" y="3135702"/>
+            <a:ext cx="1587260" cy="586596"/>
+          </a:xfrm>
+          <a:prstGeom prst="roundRect">
+            <a:avLst/>
+          </a:prstGeom>
+        </p:spPr>
+        <p:style>
+          <a:lnRef idx="2">
+            <a:schemeClr val="accent6">
+              <a:shade val="50000"/>
+            </a:schemeClr>
+          </a:lnRef>
+          <a:fillRef idx="1">
+            <a:schemeClr val="accent6"/>
+          </a:fillRef>
+          <a:effectRef idx="0">
+            <a:schemeClr val="accent6"/>
+          </a:effectRef>
+          <a:fontRef idx="minor">
+            <a:schemeClr val="lt1"/>
+          </a:fontRef>
+        </p:style>
+        <p:txBody>
+          <a:bodyPr rtlCol="0" anchor="ctr"/>
+          <a:lstStyle/>
+          <a:p>
+            <a:pPr algn="ctr"/>
+            <a:r>
+              <a:rPr lang="es-MX" dirty="0"/>
+              <a:t>AGREGAR EMPLEADO</a:t>
+            </a:r>
+          </a:p>
+        </p:txBody>
+      </p:sp>
+      <p:sp>
+        <p:nvSpPr>
+          <p:cNvPr id="8" name="Rectángulo: esquinas redondeadas 7">
+            <a:extLst>
+              <a:ext uri="{FF2B5EF4-FFF2-40B4-BE49-F238E27FC236}">
+                <a16:creationId xmlns:a16="http://schemas.microsoft.com/office/drawing/2014/main" id="{4F85B764-C42D-4066-9A79-150D7702BAD8}"/>
+              </a:ext>
+            </a:extLst>
+          </p:cNvPr>
+          <p:cNvSpPr/>
+          <p:nvPr/>
+        </p:nvSpPr>
+        <p:spPr>
+          <a:xfrm>
+            <a:off x="9046234" y="4607671"/>
+            <a:ext cx="796505" cy="261668"/>
+          </a:xfrm>
+          <a:prstGeom prst="roundRect">
+            <a:avLst/>
+          </a:prstGeom>
+        </p:spPr>
+        <p:style>
+          <a:lnRef idx="2">
+            <a:schemeClr val="accent6">
+              <a:shade val="50000"/>
+            </a:schemeClr>
+          </a:lnRef>
+          <a:fillRef idx="1">
+            <a:schemeClr val="accent6"/>
+          </a:fillRef>
+          <a:effectRef idx="0">
+            <a:schemeClr val="accent6"/>
+          </a:effectRef>
+          <a:fontRef idx="minor">
+            <a:schemeClr val="lt1"/>
+          </a:fontRef>
+        </p:style>
+        <p:txBody>
+          <a:bodyPr rtlCol="0" anchor="ctr"/>
+          <a:lstStyle/>
+          <a:p>
+            <a:pPr algn="ctr"/>
+            <a:r>
+              <a:rPr lang="es-MX" dirty="0"/>
+              <a:t>EDIT</a:t>
+            </a:r>
+          </a:p>
+        </p:txBody>
+      </p:sp>
+      <p:sp>
+        <p:nvSpPr>
+          <p:cNvPr id="9" name="Rectángulo: esquinas redondeadas 8">
+            <a:extLst>
+              <a:ext uri="{FF2B5EF4-FFF2-40B4-BE49-F238E27FC236}">
+                <a16:creationId xmlns:a16="http://schemas.microsoft.com/office/drawing/2014/main" id="{A755D9F6-9076-4279-BF67-EAD2A0A46F10}"/>
+              </a:ext>
+            </a:extLst>
+          </p:cNvPr>
+          <p:cNvSpPr/>
+          <p:nvPr/>
+        </p:nvSpPr>
+        <p:spPr>
+          <a:xfrm>
+            <a:off x="9911750" y="4607671"/>
+            <a:ext cx="796505" cy="261668"/>
+          </a:xfrm>
+          <a:prstGeom prst="roundRect">
+            <a:avLst/>
+          </a:prstGeom>
+        </p:spPr>
+        <p:style>
+          <a:lnRef idx="2">
+            <a:schemeClr val="accent6">
+              <a:shade val="50000"/>
+            </a:schemeClr>
+          </a:lnRef>
+          <a:fillRef idx="1">
+            <a:schemeClr val="accent6"/>
+          </a:fillRef>
+          <a:effectRef idx="0">
+            <a:schemeClr val="accent6"/>
+          </a:effectRef>
+          <a:fontRef idx="minor">
+            <a:schemeClr val="lt1"/>
+          </a:fontRef>
+        </p:style>
+        <p:txBody>
+          <a:bodyPr rtlCol="0" anchor="ctr"/>
+          <a:lstStyle/>
+          <a:p>
+            <a:pPr algn="ctr"/>
+            <a:r>
+              <a:rPr lang="es-MX" dirty="0"/>
+              <a:t>DEL</a:t>
+            </a:r>
+          </a:p>
+        </p:txBody>
+      </p:sp>
+      <p:sp>
+        <p:nvSpPr>
+          <p:cNvPr id="10" name="Rectángulo 9">
+            <a:extLst>
+              <a:ext uri="{FF2B5EF4-FFF2-40B4-BE49-F238E27FC236}">
+                <a16:creationId xmlns:a16="http://schemas.microsoft.com/office/drawing/2014/main" id="{C2CA3F1E-E361-4890-8FE8-6B9257E367C5}"/>
+              </a:ext>
+            </a:extLst>
+          </p:cNvPr>
+          <p:cNvSpPr/>
+          <p:nvPr/>
+        </p:nvSpPr>
+        <p:spPr>
+          <a:xfrm>
+            <a:off x="6096000" y="3135702"/>
+            <a:ext cx="3056626" cy="461513"/>
+          </a:xfrm>
+          <a:prstGeom prst="rect">
+            <a:avLst/>
+          </a:prstGeom>
+        </p:spPr>
+        <p:style>
+          <a:lnRef idx="2">
+            <a:schemeClr val="accent1">
+              <a:shade val="50000"/>
+            </a:schemeClr>
+          </a:lnRef>
+          <a:fillRef idx="1">
+            <a:schemeClr val="accent1"/>
+          </a:fillRef>
+          <a:effectRef idx="0">
+            <a:schemeClr val="accent1"/>
+          </a:effectRef>
+          <a:fontRef idx="minor">
+            <a:schemeClr val="lt1"/>
+          </a:fontRef>
+        </p:style>
+        <p:txBody>
+          <a:bodyPr rtlCol="0" anchor="ctr"/>
+          <a:lstStyle/>
+          <a:p>
+            <a:pPr algn="ctr"/>
+            <a:endParaRPr lang="es-MX"/>
+          </a:p>
+        </p:txBody>
+      </p:sp>
+    </p:spTree>
+    <p:extLst>
+      <p:ext uri="{BB962C8B-B14F-4D97-AF65-F5344CB8AC3E}">
+        <p14:creationId xmlns:p14="http://schemas.microsoft.com/office/powerpoint/2010/main" val="1897296746"/>
+      </p:ext>
+    </p:extLst>
+  </p:cSld>
+  <p:clrMapOvr>
+    <a:masterClrMapping/>
+  </p:clrMapOvr>
+</p:sld>
+</file>
+
 <file path=ppt/theme/theme1.xml><?xml version="1.0" encoding="utf-8"?>
 <a:theme xmlns:a="http://schemas.openxmlformats.org/drawingml/2006/main" name="Tema de Office">
   <a:themeElements>

</xml_diff>

<commit_message>
actualizacion del repositorio sesion 5 de php puro
</commit_message>
<xml_diff>
--- a/documentacion/Presentación1.pptx
+++ b/documentacion/Presentación1.pptx
@@ -9,6 +9,7 @@
     <p:sldId id="257" r:id="rId3"/>
     <p:sldId id="258" r:id="rId4"/>
     <p:sldId id="259" r:id="rId5"/>
+    <p:sldId id="260" r:id="rId6"/>
   </p:sldIdLst>
   <p:sldSz cx="12192000" cy="6858000"/>
   <p:notesSz cx="6858000" cy="9144000"/>
@@ -264,7 +265,7 @@
           <a:p>
             <a:fld id="{626178A4-4DCD-46FF-9DA1-8D3976C44B69}" type="datetimeFigureOut">
               <a:rPr lang="es-MX" smtClean="0"/>
-              <a:t>20/01/2022</a:t>
+              <a:t>21/01/2022</a:t>
             </a:fld>
             <a:endParaRPr lang="es-MX"/>
           </a:p>
@@ -464,7 +465,7 @@
           <a:p>
             <a:fld id="{626178A4-4DCD-46FF-9DA1-8D3976C44B69}" type="datetimeFigureOut">
               <a:rPr lang="es-MX" smtClean="0"/>
-              <a:t>20/01/2022</a:t>
+              <a:t>21/01/2022</a:t>
             </a:fld>
             <a:endParaRPr lang="es-MX"/>
           </a:p>
@@ -674,7 +675,7 @@
           <a:p>
             <a:fld id="{626178A4-4DCD-46FF-9DA1-8D3976C44B69}" type="datetimeFigureOut">
               <a:rPr lang="es-MX" smtClean="0"/>
-              <a:t>20/01/2022</a:t>
+              <a:t>21/01/2022</a:t>
             </a:fld>
             <a:endParaRPr lang="es-MX"/>
           </a:p>
@@ -874,7 +875,7 @@
           <a:p>
             <a:fld id="{626178A4-4DCD-46FF-9DA1-8D3976C44B69}" type="datetimeFigureOut">
               <a:rPr lang="es-MX" smtClean="0"/>
-              <a:t>20/01/2022</a:t>
+              <a:t>21/01/2022</a:t>
             </a:fld>
             <a:endParaRPr lang="es-MX"/>
           </a:p>
@@ -1150,7 +1151,7 @@
           <a:p>
             <a:fld id="{626178A4-4DCD-46FF-9DA1-8D3976C44B69}" type="datetimeFigureOut">
               <a:rPr lang="es-MX" smtClean="0"/>
-              <a:t>20/01/2022</a:t>
+              <a:t>21/01/2022</a:t>
             </a:fld>
             <a:endParaRPr lang="es-MX"/>
           </a:p>
@@ -1418,7 +1419,7 @@
           <a:p>
             <a:fld id="{626178A4-4DCD-46FF-9DA1-8D3976C44B69}" type="datetimeFigureOut">
               <a:rPr lang="es-MX" smtClean="0"/>
-              <a:t>20/01/2022</a:t>
+              <a:t>21/01/2022</a:t>
             </a:fld>
             <a:endParaRPr lang="es-MX"/>
           </a:p>
@@ -1833,7 +1834,7 @@
           <a:p>
             <a:fld id="{626178A4-4DCD-46FF-9DA1-8D3976C44B69}" type="datetimeFigureOut">
               <a:rPr lang="es-MX" smtClean="0"/>
-              <a:t>20/01/2022</a:t>
+              <a:t>21/01/2022</a:t>
             </a:fld>
             <a:endParaRPr lang="es-MX"/>
           </a:p>
@@ -1975,7 +1976,7 @@
           <a:p>
             <a:fld id="{626178A4-4DCD-46FF-9DA1-8D3976C44B69}" type="datetimeFigureOut">
               <a:rPr lang="es-MX" smtClean="0"/>
-              <a:t>20/01/2022</a:t>
+              <a:t>21/01/2022</a:t>
             </a:fld>
             <a:endParaRPr lang="es-MX"/>
           </a:p>
@@ -2088,7 +2089,7 @@
           <a:p>
             <a:fld id="{626178A4-4DCD-46FF-9DA1-8D3976C44B69}" type="datetimeFigureOut">
               <a:rPr lang="es-MX" smtClean="0"/>
-              <a:t>20/01/2022</a:t>
+              <a:t>21/01/2022</a:t>
             </a:fld>
             <a:endParaRPr lang="es-MX"/>
           </a:p>
@@ -2401,7 +2402,7 @@
           <a:p>
             <a:fld id="{626178A4-4DCD-46FF-9DA1-8D3976C44B69}" type="datetimeFigureOut">
               <a:rPr lang="es-MX" smtClean="0"/>
-              <a:t>20/01/2022</a:t>
+              <a:t>21/01/2022</a:t>
             </a:fld>
             <a:endParaRPr lang="es-MX"/>
           </a:p>
@@ -2690,7 +2691,7 @@
           <a:p>
             <a:fld id="{626178A4-4DCD-46FF-9DA1-8D3976C44B69}" type="datetimeFigureOut">
               <a:rPr lang="es-MX" smtClean="0"/>
-              <a:t>20/01/2022</a:t>
+              <a:t>21/01/2022</a:t>
             </a:fld>
             <a:endParaRPr lang="es-MX"/>
           </a:p>
@@ -2933,7 +2934,7 @@
           <a:p>
             <a:fld id="{626178A4-4DCD-46FF-9DA1-8D3976C44B69}" type="datetimeFigureOut">
               <a:rPr lang="es-MX" smtClean="0"/>
-              <a:t>20/01/2022</a:t>
+              <a:t>21/01/2022</a:t>
             </a:fld>
             <a:endParaRPr lang="es-MX"/>
           </a:p>
@@ -4425,7 +4426,7 @@
         </p:nvSpPr>
         <p:spPr>
           <a:xfrm>
-            <a:off x="9046234" y="4607671"/>
+            <a:off x="9969261" y="4607671"/>
             <a:ext cx="796505" cy="261668"/>
           </a:xfrm>
           <a:prstGeom prst="roundRect">
@@ -4474,7 +4475,7 @@
         </p:nvSpPr>
         <p:spPr>
           <a:xfrm>
-            <a:off x="9911750" y="4607671"/>
+            <a:off x="10886535" y="4607671"/>
             <a:ext cx="796505" cy="261668"/>
           </a:xfrm>
           <a:prstGeom prst="roundRect">
@@ -4555,10 +4556,404 @@
           </a:p>
         </p:txBody>
       </p:sp>
+      <p:sp>
+        <p:nvSpPr>
+          <p:cNvPr id="2" name="Rectángulo: esquinas redondeadas 1">
+            <a:extLst>
+              <a:ext uri="{FF2B5EF4-FFF2-40B4-BE49-F238E27FC236}">
+                <a16:creationId xmlns:a16="http://schemas.microsoft.com/office/drawing/2014/main" id="{57065B6E-6E5E-4640-AF90-A2D03E28FB13}"/>
+              </a:ext>
+            </a:extLst>
+          </p:cNvPr>
+          <p:cNvSpPr/>
+          <p:nvPr/>
+        </p:nvSpPr>
+        <p:spPr>
+          <a:xfrm>
+            <a:off x="8701179" y="4607671"/>
+            <a:ext cx="1207698" cy="261668"/>
+          </a:xfrm>
+          <a:prstGeom prst="roundRect">
+            <a:avLst/>
+          </a:prstGeom>
+        </p:spPr>
+        <p:style>
+          <a:lnRef idx="2">
+            <a:schemeClr val="accent1">
+              <a:shade val="50000"/>
+            </a:schemeClr>
+          </a:lnRef>
+          <a:fillRef idx="1">
+            <a:schemeClr val="accent1"/>
+          </a:fillRef>
+          <a:effectRef idx="0">
+            <a:schemeClr val="accent1"/>
+          </a:effectRef>
+          <a:fontRef idx="minor">
+            <a:schemeClr val="lt1"/>
+          </a:fontRef>
+        </p:style>
+        <p:txBody>
+          <a:bodyPr rtlCol="0" anchor="ctr"/>
+          <a:lstStyle/>
+          <a:p>
+            <a:pPr algn="ctr"/>
+            <a:r>
+              <a:rPr lang="es-MX" dirty="0"/>
+              <a:t>Contacto</a:t>
+            </a:r>
+          </a:p>
+        </p:txBody>
+      </p:sp>
     </p:spTree>
     <p:extLst>
       <p:ext uri="{BB962C8B-B14F-4D97-AF65-F5344CB8AC3E}">
         <p14:creationId xmlns:p14="http://schemas.microsoft.com/office/powerpoint/2010/main" val="1897296746"/>
+      </p:ext>
+    </p:extLst>
+  </p:cSld>
+  <p:clrMapOvr>
+    <a:masterClrMapping/>
+  </p:clrMapOvr>
+</p:sld>
+</file>
+
+<file path=ppt/slides/slide5.xml><?xml version="1.0" encoding="utf-8"?>
+<p:sld xmlns:a="http://schemas.openxmlformats.org/drawingml/2006/main" xmlns:r="http://schemas.openxmlformats.org/officeDocument/2006/relationships" xmlns:p="http://schemas.openxmlformats.org/presentationml/2006/main">
+  <p:cSld>
+    <p:spTree>
+      <p:nvGrpSpPr>
+        <p:cNvPr id="1" name=""/>
+        <p:cNvGrpSpPr/>
+        <p:nvPr/>
+      </p:nvGrpSpPr>
+      <p:grpSpPr>
+        <a:xfrm>
+          <a:off x="0" y="0"/>
+          <a:ext cx="0" cy="0"/>
+          <a:chOff x="0" y="0"/>
+          <a:chExt cx="0" cy="0"/>
+        </a:xfrm>
+      </p:grpSpPr>
+      <p:graphicFrame>
+        <p:nvGraphicFramePr>
+          <p:cNvPr id="5" name="Tabla 5">
+            <a:extLst>
+              <a:ext uri="{FF2B5EF4-FFF2-40B4-BE49-F238E27FC236}">
+                <a16:creationId xmlns:a16="http://schemas.microsoft.com/office/drawing/2014/main" id="{1F800E8D-E098-4D43-AC04-2248C9AD08A3}"/>
+              </a:ext>
+            </a:extLst>
+          </p:cNvPr>
+          <p:cNvGraphicFramePr>
+            <a:graphicFrameLocks noGrp="1"/>
+          </p:cNvGraphicFramePr>
+          <p:nvPr>
+            <p:extLst>
+              <p:ext uri="{D42A27DB-BD31-4B8C-83A1-F6EECF244321}">
+                <p14:modId xmlns:p14="http://schemas.microsoft.com/office/powerpoint/2010/main" val="566945182"/>
+              </p:ext>
+            </p:extLst>
+          </p:nvPr>
+        </p:nvGraphicFramePr>
+        <p:xfrm>
+          <a:off x="1126226" y="3915083"/>
+          <a:ext cx="10096740" cy="1385177"/>
+        </p:xfrm>
+        <a:graphic>
+          <a:graphicData uri="http://schemas.openxmlformats.org/drawingml/2006/table">
+            <a:tbl>
+              <a:tblPr firstRow="1" bandRow="1">
+                <a:tableStyleId>{5C22544A-7EE6-4342-B048-85BDC9FD1C3A}</a:tableStyleId>
+              </a:tblPr>
+              <a:tblGrid>
+                <a:gridCol w="3365580">
+                  <a:extLst>
+                    <a:ext uri="{9D8B030D-6E8A-4147-A177-3AD203B41FA5}">
+                      <a16:colId xmlns:a16="http://schemas.microsoft.com/office/drawing/2014/main" val="1749993445"/>
+                    </a:ext>
+                  </a:extLst>
+                </a:gridCol>
+                <a:gridCol w="3365580">
+                  <a:extLst>
+                    <a:ext uri="{9D8B030D-6E8A-4147-A177-3AD203B41FA5}">
+                      <a16:colId xmlns:a16="http://schemas.microsoft.com/office/drawing/2014/main" val="1898327658"/>
+                    </a:ext>
+                  </a:extLst>
+                </a:gridCol>
+                <a:gridCol w="3365580">
+                  <a:extLst>
+                    <a:ext uri="{9D8B030D-6E8A-4147-A177-3AD203B41FA5}">
+                      <a16:colId xmlns:a16="http://schemas.microsoft.com/office/drawing/2014/main" val="1322404911"/>
+                    </a:ext>
+                  </a:extLst>
+                </a:gridCol>
+              </a:tblGrid>
+              <a:tr h="641663">
+                <a:tc>
+                  <a:txBody>
+                    <a:bodyPr/>
+                    <a:lstStyle/>
+                    <a:p>
+                      <a:r>
+                        <a:rPr lang="es-MX" dirty="0"/>
+                        <a:t>Tipo de contacto</a:t>
+                      </a:r>
+                    </a:p>
+                  </a:txBody>
+                  <a:tcPr/>
+                </a:tc>
+                <a:tc>
+                  <a:txBody>
+                    <a:bodyPr/>
+                    <a:lstStyle/>
+                    <a:p>
+                      <a:r>
+                        <a:rPr lang="es-MX" dirty="0"/>
+                        <a:t>dato</a:t>
+                      </a:r>
+                    </a:p>
+                  </a:txBody>
+                  <a:tcPr/>
+                </a:tc>
+                <a:tc>
+                  <a:txBody>
+                    <a:bodyPr/>
+                    <a:lstStyle/>
+                    <a:p>
+                      <a:r>
+                        <a:rPr lang="es-MX" dirty="0"/>
+                        <a:t>OPERACIONES</a:t>
+                      </a:r>
+                    </a:p>
+                  </a:txBody>
+                  <a:tcPr/>
+                </a:tc>
+                <a:extLst>
+                  <a:ext uri="{0D108BD9-81ED-4DB2-BD59-A6C34878D82A}">
+                    <a16:rowId xmlns:a16="http://schemas.microsoft.com/office/drawing/2014/main" val="2597275433"/>
+                  </a:ext>
+                </a:extLst>
+              </a:tr>
+              <a:tr h="371757">
+                <a:tc>
+                  <a:txBody>
+                    <a:bodyPr/>
+                    <a:lstStyle/>
+                    <a:p>
+                      <a:r>
+                        <a:rPr lang="es-MX" dirty="0" err="1"/>
+                        <a:t>Telefono</a:t>
+                      </a:r>
+                      <a:endParaRPr lang="es-MX" dirty="0"/>
+                    </a:p>
+                  </a:txBody>
+                  <a:tcPr/>
+                </a:tc>
+                <a:tc>
+                  <a:txBody>
+                    <a:bodyPr/>
+                    <a:lstStyle/>
+                    <a:p>
+                      <a:r>
+                        <a:rPr lang="es-MX" dirty="0"/>
+                        <a:t>2467575099</a:t>
+                      </a:r>
+                    </a:p>
+                  </a:txBody>
+                  <a:tcPr/>
+                </a:tc>
+                <a:tc>
+                  <a:txBody>
+                    <a:bodyPr/>
+                    <a:lstStyle/>
+                    <a:p>
+                      <a:endParaRPr lang="es-MX" dirty="0"/>
+                    </a:p>
+                  </a:txBody>
+                  <a:tcPr/>
+                </a:tc>
+                <a:extLst>
+                  <a:ext uri="{0D108BD9-81ED-4DB2-BD59-A6C34878D82A}">
+                    <a16:rowId xmlns:a16="http://schemas.microsoft.com/office/drawing/2014/main" val="1324048703"/>
+                  </a:ext>
+                </a:extLst>
+              </a:tr>
+              <a:tr h="371757">
+                <a:tc>
+                  <a:txBody>
+                    <a:bodyPr/>
+                    <a:lstStyle/>
+                    <a:p>
+                      <a:r>
+                        <a:rPr lang="es-MX" dirty="0"/>
+                        <a:t>correo</a:t>
+                      </a:r>
+                    </a:p>
+                  </a:txBody>
+                  <a:tcPr/>
+                </a:tc>
+                <a:tc>
+                  <a:txBody>
+                    <a:bodyPr/>
+                    <a:lstStyle/>
+                    <a:p>
+                      <a:r>
+                        <a:rPr lang="es-MX" dirty="0"/>
+                        <a:t>Enrique_cr1990@hotmail.com</a:t>
+                      </a:r>
+                    </a:p>
+                  </a:txBody>
+                  <a:tcPr/>
+                </a:tc>
+                <a:tc>
+                  <a:txBody>
+                    <a:bodyPr/>
+                    <a:lstStyle/>
+                    <a:p>
+                      <a:endParaRPr lang="es-MX" dirty="0"/>
+                    </a:p>
+                  </a:txBody>
+                  <a:tcPr/>
+                </a:tc>
+                <a:extLst>
+                  <a:ext uri="{0D108BD9-81ED-4DB2-BD59-A6C34878D82A}">
+                    <a16:rowId xmlns:a16="http://schemas.microsoft.com/office/drawing/2014/main" val="1017608078"/>
+                  </a:ext>
+                </a:extLst>
+              </a:tr>
+            </a:tbl>
+          </a:graphicData>
+        </a:graphic>
+      </p:graphicFrame>
+      <p:sp>
+        <p:nvSpPr>
+          <p:cNvPr id="6" name="Rectángulo: esquinas redondeadas 5">
+            <a:extLst>
+              <a:ext uri="{FF2B5EF4-FFF2-40B4-BE49-F238E27FC236}">
+                <a16:creationId xmlns:a16="http://schemas.microsoft.com/office/drawing/2014/main" id="{74D02CB0-4991-4052-B6AB-BE1CE6856B2C}"/>
+              </a:ext>
+            </a:extLst>
+          </p:cNvPr>
+          <p:cNvSpPr/>
+          <p:nvPr/>
+        </p:nvSpPr>
+        <p:spPr>
+          <a:xfrm>
+            <a:off x="9454551" y="2942917"/>
+            <a:ext cx="1699404" cy="612476"/>
+          </a:xfrm>
+          <a:prstGeom prst="roundRect">
+            <a:avLst/>
+          </a:prstGeom>
+        </p:spPr>
+        <p:style>
+          <a:lnRef idx="2">
+            <a:schemeClr val="accent1">
+              <a:shade val="50000"/>
+            </a:schemeClr>
+          </a:lnRef>
+          <a:fillRef idx="1">
+            <a:schemeClr val="accent1"/>
+          </a:fillRef>
+          <a:effectRef idx="0">
+            <a:schemeClr val="accent1"/>
+          </a:effectRef>
+          <a:fontRef idx="minor">
+            <a:schemeClr val="lt1"/>
+          </a:fontRef>
+        </p:style>
+        <p:txBody>
+          <a:bodyPr rtlCol="0" anchor="ctr"/>
+          <a:lstStyle/>
+          <a:p>
+            <a:pPr algn="ctr"/>
+            <a:r>
+              <a:rPr lang="es-MX" dirty="0"/>
+              <a:t>Nuevo contacto</a:t>
+            </a:r>
+          </a:p>
+        </p:txBody>
+      </p:sp>
+      <p:sp>
+        <p:nvSpPr>
+          <p:cNvPr id="7" name="CuadroTexto 6">
+            <a:extLst>
+              <a:ext uri="{FF2B5EF4-FFF2-40B4-BE49-F238E27FC236}">
+                <a16:creationId xmlns:a16="http://schemas.microsoft.com/office/drawing/2014/main" id="{B4CE7274-D700-44A1-8883-29ADC781A91D}"/>
+              </a:ext>
+            </a:extLst>
+          </p:cNvPr>
+          <p:cNvSpPr txBox="1"/>
+          <p:nvPr/>
+        </p:nvSpPr>
+        <p:spPr>
+          <a:xfrm>
+            <a:off x="1160732" y="1259457"/>
+            <a:ext cx="2062231" cy="646331"/>
+          </a:xfrm>
+          <a:prstGeom prst="rect">
+            <a:avLst/>
+          </a:prstGeom>
+          <a:noFill/>
+        </p:spPr>
+        <p:txBody>
+          <a:bodyPr wrap="none" rtlCol="0">
+            <a:spAutoFit/>
+          </a:bodyPr>
+          <a:lstStyle/>
+          <a:p>
+            <a:r>
+              <a:rPr lang="es-MX" dirty="0"/>
+              <a:t>Datos del empleado</a:t>
+            </a:r>
+          </a:p>
+          <a:p>
+            <a:r>
+              <a:rPr lang="es-MX" dirty="0"/>
+              <a:t>Nombre completo</a:t>
+            </a:r>
+          </a:p>
+        </p:txBody>
+      </p:sp>
+      <p:sp>
+        <p:nvSpPr>
+          <p:cNvPr id="8" name="CuadroTexto 7">
+            <a:extLst>
+              <a:ext uri="{FF2B5EF4-FFF2-40B4-BE49-F238E27FC236}">
+                <a16:creationId xmlns:a16="http://schemas.microsoft.com/office/drawing/2014/main" id="{50BBF78B-1436-4240-8587-332852CADA1B}"/>
+              </a:ext>
+            </a:extLst>
+          </p:cNvPr>
+          <p:cNvSpPr txBox="1"/>
+          <p:nvPr/>
+        </p:nvSpPr>
+        <p:spPr>
+          <a:xfrm>
+            <a:off x="4520242" y="327804"/>
+            <a:ext cx="1859805" cy="369332"/>
+          </a:xfrm>
+          <a:prstGeom prst="rect">
+            <a:avLst/>
+          </a:prstGeom>
+          <a:noFill/>
+        </p:spPr>
+        <p:txBody>
+          <a:bodyPr wrap="none" rtlCol="0">
+            <a:spAutoFit/>
+          </a:bodyPr>
+          <a:lstStyle/>
+          <a:p>
+            <a:r>
+              <a:rPr lang="es-MX" dirty="0"/>
+              <a:t>PRIMERA OPCION</a:t>
+            </a:r>
+          </a:p>
+        </p:txBody>
+      </p:sp>
+    </p:spTree>
+    <p:extLst>
+      <p:ext uri="{BB962C8B-B14F-4D97-AF65-F5344CB8AC3E}">
+        <p14:creationId xmlns:p14="http://schemas.microsoft.com/office/powerpoint/2010/main" val="3875350198"/>
       </p:ext>
     </p:extLst>
   </p:cSld>

</xml_diff>